<commit_message>
Update Five Guys project presentation template.pptx
</commit_message>
<xml_diff>
--- a/Five Guys project presentation template.pptx
+++ b/Five Guys project presentation template.pptx
@@ -294,7 +294,7 @@
   </p:defaultTextStyle>
   <p:extLst>
     <p:ext uri="GoogleSlidesCustomDataVersion2">
-      <go:slidesCustomData xmlns:go="http://customooxmlschemas.google.com/" r:id="rId40" roundtripDataSignature="AMtx7miGOSCAaoAhqTAg3S06VFilUCmjSg=="/>
+      <go:slidesCustomData xmlns:go="http://customooxmlschemas.google.com/" r:id="rId40" roundtripDataSignature="AMtx7mjOwHdYFrso1SGe4mjNhK7FNvUzTw=="/>
     </p:ext>
   </p:extLst>
 </p:presentation>
@@ -1877,7 +1877,7 @@
   <p:cSld>
     <p:spTree>
       <p:nvGrpSpPr>
-        <p:cNvPr id="441" name="Shape 441"/>
+        <p:cNvPr id="440" name="Shape 440"/>
         <p:cNvGrpSpPr/>
         <p:nvPr/>
       </p:nvGrpSpPr>
@@ -1891,7 +1891,7 @@
       </p:grpSpPr>
       <p:sp>
         <p:nvSpPr>
-          <p:cNvPr id="442" name="Google Shape;442;g30edab3001c_2_1172:notes"/>
+          <p:cNvPr id="441" name="Google Shape;441;g30edab3001c_2_1172:notes"/>
           <p:cNvSpPr/>
           <p:nvPr>
             <p:ph idx="2" type="sldImg"/>
@@ -1926,7 +1926,7 @@
       </p:sp>
       <p:sp>
         <p:nvSpPr>
-          <p:cNvPr id="443" name="Google Shape;443;g30edab3001c_2_1172:notes"/>
+          <p:cNvPr id="442" name="Google Shape;442;g30edab3001c_2_1172:notes"/>
           <p:cNvSpPr txBox="1"/>
           <p:nvPr>
             <p:ph idx="1" type="body"/>
@@ -1965,7 +1965,7 @@
       </p:sp>
       <p:sp>
         <p:nvSpPr>
-          <p:cNvPr id="444" name="Google Shape;444;g30edab3001c_2_1172:notes"/>
+          <p:cNvPr id="443" name="Google Shape;443;g30edab3001c_2_1172:notes"/>
           <p:cNvSpPr txBox="1"/>
           <p:nvPr>
             <p:ph idx="12" type="sldNum"/>
@@ -2016,7 +2016,7 @@
   <p:cSld>
     <p:spTree>
       <p:nvGrpSpPr>
-        <p:cNvPr id="453" name="Shape 453"/>
+        <p:cNvPr id="452" name="Shape 452"/>
         <p:cNvGrpSpPr/>
         <p:nvPr/>
       </p:nvGrpSpPr>
@@ -2030,7 +2030,7 @@
       </p:grpSpPr>
       <p:sp>
         <p:nvSpPr>
-          <p:cNvPr id="454" name="Google Shape;454;g30edab3001c_2_1218:notes"/>
+          <p:cNvPr id="453" name="Google Shape;453;g30edab3001c_2_1218:notes"/>
           <p:cNvSpPr/>
           <p:nvPr>
             <p:ph idx="2" type="sldImg"/>
@@ -2065,7 +2065,7 @@
       </p:sp>
       <p:sp>
         <p:nvSpPr>
-          <p:cNvPr id="455" name="Google Shape;455;g30edab3001c_2_1218:notes"/>
+          <p:cNvPr id="454" name="Google Shape;454;g30edab3001c_2_1218:notes"/>
           <p:cNvSpPr txBox="1"/>
           <p:nvPr>
             <p:ph idx="1" type="body"/>
@@ -2104,7 +2104,7 @@
       </p:sp>
       <p:sp>
         <p:nvSpPr>
-          <p:cNvPr id="456" name="Google Shape;456;g30edab3001c_2_1218:notes"/>
+          <p:cNvPr id="455" name="Google Shape;455;g30edab3001c_2_1218:notes"/>
           <p:cNvSpPr txBox="1"/>
           <p:nvPr>
             <p:ph idx="12" type="sldNum"/>
@@ -2155,7 +2155,7 @@
   <p:cSld>
     <p:spTree>
       <p:nvGrpSpPr>
-        <p:cNvPr id="460" name="Shape 460"/>
+        <p:cNvPr id="459" name="Shape 459"/>
         <p:cNvGrpSpPr/>
         <p:nvPr/>
       </p:nvGrpSpPr>
@@ -2169,7 +2169,7 @@
       </p:grpSpPr>
       <p:sp>
         <p:nvSpPr>
-          <p:cNvPr id="461" name="Google Shape;461;g3100cd6168a_0_0:notes"/>
+          <p:cNvPr id="460" name="Google Shape;460;g3100cd6168a_0_0:notes"/>
           <p:cNvSpPr/>
           <p:nvPr>
             <p:ph idx="2" type="sldImg"/>
@@ -2204,7 +2204,7 @@
       </p:sp>
       <p:sp>
         <p:nvSpPr>
-          <p:cNvPr id="462" name="Google Shape;462;g3100cd6168a_0_0:notes"/>
+          <p:cNvPr id="461" name="Google Shape;461;g3100cd6168a_0_0:notes"/>
           <p:cNvSpPr txBox="1"/>
           <p:nvPr>
             <p:ph idx="1" type="body"/>
@@ -2243,7 +2243,7 @@
       </p:sp>
       <p:sp>
         <p:nvSpPr>
-          <p:cNvPr id="463" name="Google Shape;463;g3100cd6168a_0_0:notes"/>
+          <p:cNvPr id="462" name="Google Shape;462;g3100cd6168a_0_0:notes"/>
           <p:cNvSpPr txBox="1"/>
           <p:nvPr>
             <p:ph idx="12" type="sldNum"/>
@@ -2299,7 +2299,7 @@
   <p:cSld>
     <p:spTree>
       <p:nvGrpSpPr>
-        <p:cNvPr id="472" name="Shape 472"/>
+        <p:cNvPr id="471" name="Shape 471"/>
         <p:cNvGrpSpPr/>
         <p:nvPr/>
       </p:nvGrpSpPr>
@@ -2313,7 +2313,7 @@
       </p:grpSpPr>
       <p:sp>
         <p:nvSpPr>
-          <p:cNvPr id="473" name="Google Shape;473;g30edab3001c_2_1204:notes"/>
+          <p:cNvPr id="472" name="Google Shape;472;g30edab3001c_2_1204:notes"/>
           <p:cNvSpPr/>
           <p:nvPr>
             <p:ph idx="2" type="sldImg"/>
@@ -2348,7 +2348,7 @@
       </p:sp>
       <p:sp>
         <p:nvSpPr>
-          <p:cNvPr id="474" name="Google Shape;474;g30edab3001c_2_1204:notes"/>
+          <p:cNvPr id="473" name="Google Shape;473;g30edab3001c_2_1204:notes"/>
           <p:cNvSpPr txBox="1"/>
           <p:nvPr>
             <p:ph idx="1" type="body"/>
@@ -2387,7 +2387,7 @@
       </p:sp>
       <p:sp>
         <p:nvSpPr>
-          <p:cNvPr id="475" name="Google Shape;475;g30edab3001c_2_1204:notes"/>
+          <p:cNvPr id="474" name="Google Shape;474;g30edab3001c_2_1204:notes"/>
           <p:cNvSpPr txBox="1"/>
           <p:nvPr>
             <p:ph idx="12" type="sldNum"/>
@@ -2443,7 +2443,7 @@
   <p:cSld>
     <p:spTree>
       <p:nvGrpSpPr>
-        <p:cNvPr id="480" name="Shape 480"/>
+        <p:cNvPr id="479" name="Shape 479"/>
         <p:cNvGrpSpPr/>
         <p:nvPr/>
       </p:nvGrpSpPr>
@@ -2457,7 +2457,7 @@
       </p:grpSpPr>
       <p:sp>
         <p:nvSpPr>
-          <p:cNvPr id="481" name="Google Shape;481;g30edab3001c_2_1184:notes"/>
+          <p:cNvPr id="480" name="Google Shape;480;g30edab3001c_2_1184:notes"/>
           <p:cNvSpPr/>
           <p:nvPr>
             <p:ph idx="2" type="sldImg"/>
@@ -2492,7 +2492,7 @@
       </p:sp>
       <p:sp>
         <p:nvSpPr>
-          <p:cNvPr id="482" name="Google Shape;482;g30edab3001c_2_1184:notes"/>
+          <p:cNvPr id="481" name="Google Shape;481;g30edab3001c_2_1184:notes"/>
           <p:cNvSpPr txBox="1"/>
           <p:nvPr>
             <p:ph idx="1" type="body"/>
@@ -2531,7 +2531,7 @@
       </p:sp>
       <p:sp>
         <p:nvSpPr>
-          <p:cNvPr id="483" name="Google Shape;483;g30edab3001c_2_1184:notes"/>
+          <p:cNvPr id="482" name="Google Shape;482;g30edab3001c_2_1184:notes"/>
           <p:cNvSpPr txBox="1"/>
           <p:nvPr>
             <p:ph idx="12" type="sldNum"/>
@@ -2582,7 +2582,7 @@
   <p:cSld>
     <p:spTree>
       <p:nvGrpSpPr>
-        <p:cNvPr id="492" name="Shape 492"/>
+        <p:cNvPr id="491" name="Shape 491"/>
         <p:cNvGrpSpPr/>
         <p:nvPr/>
       </p:nvGrpSpPr>
@@ -2596,7 +2596,7 @@
       </p:grpSpPr>
       <p:sp>
         <p:nvSpPr>
-          <p:cNvPr id="493" name="Google Shape;493;g30f9ff7ea99_0_42:notes"/>
+          <p:cNvPr id="492" name="Google Shape;492;g30f9ff7ea99_0_42:notes"/>
           <p:cNvSpPr/>
           <p:nvPr>
             <p:ph idx="2" type="sldImg"/>
@@ -2631,7 +2631,7 @@
       </p:sp>
       <p:sp>
         <p:nvSpPr>
-          <p:cNvPr id="494" name="Google Shape;494;g30f9ff7ea99_0_42:notes"/>
+          <p:cNvPr id="493" name="Google Shape;493;g30f9ff7ea99_0_42:notes"/>
           <p:cNvSpPr txBox="1"/>
           <p:nvPr>
             <p:ph idx="1" type="body"/>
@@ -2670,7 +2670,7 @@
       </p:sp>
       <p:sp>
         <p:nvSpPr>
-          <p:cNvPr id="495" name="Google Shape;495;g30f9ff7ea99_0_42:notes"/>
+          <p:cNvPr id="494" name="Google Shape;494;g30f9ff7ea99_0_42:notes"/>
           <p:cNvSpPr txBox="1"/>
           <p:nvPr>
             <p:ph idx="12" type="sldNum"/>
@@ -2726,7 +2726,7 @@
   <p:cSld>
     <p:spTree>
       <p:nvGrpSpPr>
-        <p:cNvPr id="506" name="Shape 506"/>
+        <p:cNvPr id="508" name="Shape 508"/>
         <p:cNvGrpSpPr/>
         <p:nvPr/>
       </p:nvGrpSpPr>
@@ -2740,7 +2740,7 @@
       </p:grpSpPr>
       <p:sp>
         <p:nvSpPr>
-          <p:cNvPr id="507" name="Google Shape;507;g3100cd6168a_6_32:notes"/>
+          <p:cNvPr id="509" name="Google Shape;509;g3100cd6168a_6_32:notes"/>
           <p:cNvSpPr/>
           <p:nvPr>
             <p:ph idx="2" type="sldImg"/>
@@ -2775,7 +2775,7 @@
       </p:sp>
       <p:sp>
         <p:nvSpPr>
-          <p:cNvPr id="508" name="Google Shape;508;g3100cd6168a_6_32:notes"/>
+          <p:cNvPr id="510" name="Google Shape;510;g3100cd6168a_6_32:notes"/>
           <p:cNvSpPr txBox="1"/>
           <p:nvPr>
             <p:ph idx="1" type="body"/>
@@ -2814,7 +2814,7 @@
       </p:sp>
       <p:sp>
         <p:nvSpPr>
-          <p:cNvPr id="509" name="Google Shape;509;g3100cd6168a_6_32:notes"/>
+          <p:cNvPr id="511" name="Google Shape;511;g3100cd6168a_6_32:notes"/>
           <p:cNvSpPr txBox="1"/>
           <p:nvPr>
             <p:ph idx="12" type="sldNum"/>
@@ -2865,7 +2865,7 @@
   <p:cSld>
     <p:spTree>
       <p:nvGrpSpPr>
-        <p:cNvPr id="518" name="Shape 518"/>
+        <p:cNvPr id="520" name="Shape 520"/>
         <p:cNvGrpSpPr/>
         <p:nvPr/>
       </p:nvGrpSpPr>
@@ -2879,7 +2879,7 @@
       </p:grpSpPr>
       <p:sp>
         <p:nvSpPr>
-          <p:cNvPr id="519" name="Google Shape;519;g3100cd6168a_6_43:notes"/>
+          <p:cNvPr id="521" name="Google Shape;521;g3100cd6168a_6_43:notes"/>
           <p:cNvSpPr/>
           <p:nvPr>
             <p:ph idx="2" type="sldImg"/>
@@ -2914,7 +2914,7 @@
       </p:sp>
       <p:sp>
         <p:nvSpPr>
-          <p:cNvPr id="520" name="Google Shape;520;g3100cd6168a_6_43:notes"/>
+          <p:cNvPr id="522" name="Google Shape;522;g3100cd6168a_6_43:notes"/>
           <p:cNvSpPr txBox="1"/>
           <p:nvPr>
             <p:ph idx="1" type="body"/>
@@ -2953,7 +2953,7 @@
       </p:sp>
       <p:sp>
         <p:nvSpPr>
-          <p:cNvPr id="521" name="Google Shape;521;g3100cd6168a_6_43:notes"/>
+          <p:cNvPr id="523" name="Google Shape;523;g3100cd6168a_6_43:notes"/>
           <p:cNvSpPr txBox="1"/>
           <p:nvPr>
             <p:ph idx="12" type="sldNum"/>
@@ -3009,7 +3009,7 @@
   <p:cSld>
     <p:spTree>
       <p:nvGrpSpPr>
-        <p:cNvPr id="525" name="Shape 525"/>
+        <p:cNvPr id="527" name="Shape 527"/>
         <p:cNvGrpSpPr/>
         <p:nvPr/>
       </p:nvGrpSpPr>
@@ -3023,7 +3023,7 @@
       </p:grpSpPr>
       <p:sp>
         <p:nvSpPr>
-          <p:cNvPr id="526" name="Google Shape;526;g30edab3001c_2_1230:notes"/>
+          <p:cNvPr id="528" name="Google Shape;528;g30edab3001c_2_1230:notes"/>
           <p:cNvSpPr/>
           <p:nvPr>
             <p:ph idx="2" type="sldImg"/>
@@ -3058,7 +3058,7 @@
       </p:sp>
       <p:sp>
         <p:nvSpPr>
-          <p:cNvPr id="527" name="Google Shape;527;g30edab3001c_2_1230:notes"/>
+          <p:cNvPr id="529" name="Google Shape;529;g30edab3001c_2_1230:notes"/>
           <p:cNvSpPr txBox="1"/>
           <p:nvPr>
             <p:ph idx="1" type="body"/>
@@ -3097,7 +3097,7 @@
       </p:sp>
       <p:sp>
         <p:nvSpPr>
-          <p:cNvPr id="528" name="Google Shape;528;g30edab3001c_2_1230:notes"/>
+          <p:cNvPr id="530" name="Google Shape;530;g30edab3001c_2_1230:notes"/>
           <p:cNvSpPr txBox="1"/>
           <p:nvPr>
             <p:ph idx="12" type="sldNum"/>
@@ -4156,7 +4156,7 @@
   <p:cSld>
     <p:spTree>
       <p:nvGrpSpPr>
-        <p:cNvPr id="434" name="Shape 434"/>
+        <p:cNvPr id="433" name="Shape 433"/>
         <p:cNvGrpSpPr/>
         <p:nvPr/>
       </p:nvGrpSpPr>
@@ -4170,7 +4170,7 @@
       </p:grpSpPr>
       <p:sp>
         <p:nvSpPr>
-          <p:cNvPr id="435" name="Google Shape;435;g3100cd6168a_2_1:notes"/>
+          <p:cNvPr id="434" name="Google Shape;434;g3100cd6168a_2_1:notes"/>
           <p:cNvSpPr/>
           <p:nvPr>
             <p:ph idx="2" type="sldImg"/>
@@ -4205,7 +4205,7 @@
       </p:sp>
       <p:sp>
         <p:nvSpPr>
-          <p:cNvPr id="436" name="Google Shape;436;g3100cd6168a_2_1:notes"/>
+          <p:cNvPr id="435" name="Google Shape;435;g3100cd6168a_2_1:notes"/>
           <p:cNvSpPr txBox="1"/>
           <p:nvPr>
             <p:ph idx="1" type="body"/>
@@ -4244,7 +4244,7 @@
       </p:sp>
       <p:sp>
         <p:nvSpPr>
-          <p:cNvPr id="437" name="Google Shape;437;g3100cd6168a_2_1:notes"/>
+          <p:cNvPr id="436" name="Google Shape;436;g3100cd6168a_2_1:notes"/>
           <p:cNvSpPr txBox="1"/>
           <p:nvPr>
             <p:ph idx="12" type="sldNum"/>
@@ -28337,7 +28337,7 @@
   <p:cSld>
     <p:spTree>
       <p:nvGrpSpPr>
-        <p:cNvPr id="445" name="Shape 445"/>
+        <p:cNvPr id="444" name="Shape 444"/>
         <p:cNvGrpSpPr/>
         <p:nvPr/>
       </p:nvGrpSpPr>
@@ -28351,7 +28351,7 @@
       </p:grpSpPr>
       <p:sp>
         <p:nvSpPr>
-          <p:cNvPr id="446" name="Google Shape;446;g30edab3001c_2_1172"/>
+          <p:cNvPr id="445" name="Google Shape;445;g30edab3001c_2_1172"/>
           <p:cNvSpPr txBox="1"/>
           <p:nvPr>
             <p:ph type="title"/>
@@ -28391,7 +28391,7 @@
       </p:sp>
       <p:sp>
         <p:nvSpPr>
-          <p:cNvPr id="447" name="Google Shape;447;g30edab3001c_2_1172"/>
+          <p:cNvPr id="446" name="Google Shape;446;g30edab3001c_2_1172"/>
           <p:cNvSpPr txBox="1"/>
           <p:nvPr/>
         </p:nvSpPr>
@@ -28433,7 +28433,7 @@
       </p:sp>
       <p:sp>
         <p:nvSpPr>
-          <p:cNvPr id="448" name="Google Shape;448;g30edab3001c_2_1172"/>
+          <p:cNvPr id="447" name="Google Shape;447;g30edab3001c_2_1172"/>
           <p:cNvSpPr txBox="1"/>
           <p:nvPr>
             <p:ph idx="2" type="title"/>
@@ -28473,7 +28473,7 @@
       </p:sp>
       <p:grpSp>
         <p:nvGrpSpPr>
-          <p:cNvPr id="449" name="Google Shape;449;g30edab3001c_2_1172"/>
+          <p:cNvPr id="448" name="Google Shape;448;g30edab3001c_2_1172"/>
           <p:cNvGrpSpPr/>
           <p:nvPr/>
         </p:nvGrpSpPr>
@@ -28487,7 +28487,7 @@
         </p:grpSpPr>
         <p:sp>
           <p:nvSpPr>
-            <p:cNvPr id="450" name="Google Shape;450;g30edab3001c_2_1172"/>
+            <p:cNvPr id="449" name="Google Shape;449;g30edab3001c_2_1172"/>
             <p:cNvSpPr/>
             <p:nvPr/>
           </p:nvSpPr>
@@ -28541,7 +28541,7 @@
         </p:sp>
         <p:sp>
           <p:nvSpPr>
-            <p:cNvPr id="451" name="Google Shape;451;g30edab3001c_2_1172"/>
+            <p:cNvPr id="450" name="Google Shape;450;g30edab3001c_2_1172"/>
             <p:cNvSpPr/>
             <p:nvPr/>
           </p:nvSpPr>
@@ -28595,7 +28595,7 @@
         </p:sp>
         <p:sp>
           <p:nvSpPr>
-            <p:cNvPr id="452" name="Google Shape;452;g30edab3001c_2_1172"/>
+            <p:cNvPr id="451" name="Google Shape;451;g30edab3001c_2_1172"/>
             <p:cNvSpPr/>
             <p:nvPr/>
           </p:nvSpPr>
@@ -28661,7 +28661,7 @@
   <p:cSld>
     <p:spTree>
       <p:nvGrpSpPr>
-        <p:cNvPr id="457" name="Shape 457"/>
+        <p:cNvPr id="456" name="Shape 456"/>
         <p:cNvGrpSpPr/>
         <p:nvPr/>
       </p:nvGrpSpPr>
@@ -28673,6 +28673,34 @@
           <a:chExt cx="0" cy="0"/>
         </a:xfrm>
       </p:grpSpPr>
+      <p:pic>
+        <p:nvPicPr>
+          <p:cNvPr id="457" name="Google Shape;457;g30edab3001c_2_1218"/>
+          <p:cNvPicPr preferRelativeResize="0"/>
+          <p:nvPr/>
+        </p:nvPicPr>
+        <p:blipFill>
+          <a:blip r:embed="rId3">
+            <a:alphaModFix/>
+          </a:blip>
+          <a:stretch>
+            <a:fillRect/>
+          </a:stretch>
+        </p:blipFill>
+        <p:spPr>
+          <a:xfrm>
+            <a:off x="2004525" y="1297925"/>
+            <a:ext cx="7975650" cy="5379175"/>
+          </a:xfrm>
+          <a:prstGeom prst="rect">
+            <a:avLst/>
+          </a:prstGeom>
+          <a:noFill/>
+          <a:ln>
+            <a:noFill/>
+          </a:ln>
+        </p:spPr>
+      </p:pic>
       <p:sp>
         <p:nvSpPr>
           <p:cNvPr id="458" name="Google Shape;458;g30edab3001c_2_1218"/>
@@ -28713,34 +28741,6 @@
           </a:p>
         </p:txBody>
       </p:sp>
-      <p:pic>
-        <p:nvPicPr>
-          <p:cNvPr id="459" name="Google Shape;459;g30edab3001c_2_1218"/>
-          <p:cNvPicPr preferRelativeResize="0"/>
-          <p:nvPr/>
-        </p:nvPicPr>
-        <p:blipFill>
-          <a:blip r:embed="rId3">
-            <a:alphaModFix/>
-          </a:blip>
-          <a:stretch>
-            <a:fillRect/>
-          </a:stretch>
-        </p:blipFill>
-        <p:spPr>
-          <a:xfrm>
-            <a:off x="1482163" y="1370055"/>
-            <a:ext cx="9227675" cy="4817725"/>
-          </a:xfrm>
-          <a:prstGeom prst="rect">
-            <a:avLst/>
-          </a:prstGeom>
-          <a:noFill/>
-          <a:ln>
-            <a:noFill/>
-          </a:ln>
-        </p:spPr>
-      </p:pic>
     </p:spTree>
   </p:cSld>
   <p:clrMapOvr>
@@ -28754,7 +28754,7 @@
   <p:cSld>
     <p:spTree>
       <p:nvGrpSpPr>
-        <p:cNvPr id="464" name="Shape 464"/>
+        <p:cNvPr id="463" name="Shape 463"/>
         <p:cNvGrpSpPr/>
         <p:nvPr/>
       </p:nvGrpSpPr>
@@ -28768,7 +28768,7 @@
       </p:grpSpPr>
       <p:sp>
         <p:nvSpPr>
-          <p:cNvPr id="465" name="Google Shape;465;g3100cd6168a_0_0"/>
+          <p:cNvPr id="464" name="Google Shape;464;g3100cd6168a_0_0"/>
           <p:cNvSpPr txBox="1"/>
           <p:nvPr>
             <p:ph type="title"/>
@@ -28808,7 +28808,7 @@
       </p:sp>
       <p:sp>
         <p:nvSpPr>
-          <p:cNvPr id="466" name="Google Shape;466;g3100cd6168a_0_0"/>
+          <p:cNvPr id="465" name="Google Shape;465;g3100cd6168a_0_0"/>
           <p:cNvSpPr txBox="1"/>
           <p:nvPr/>
         </p:nvSpPr>
@@ -28850,7 +28850,7 @@
       </p:sp>
       <p:sp>
         <p:nvSpPr>
-          <p:cNvPr id="467" name="Google Shape;467;g3100cd6168a_0_0"/>
+          <p:cNvPr id="466" name="Google Shape;466;g3100cd6168a_0_0"/>
           <p:cNvSpPr txBox="1"/>
           <p:nvPr>
             <p:ph idx="2" type="title"/>
@@ -28890,7 +28890,7 @@
       </p:sp>
       <p:grpSp>
         <p:nvGrpSpPr>
-          <p:cNvPr id="468" name="Google Shape;468;g3100cd6168a_0_0"/>
+          <p:cNvPr id="467" name="Google Shape;467;g3100cd6168a_0_0"/>
           <p:cNvGrpSpPr/>
           <p:nvPr/>
         </p:nvGrpSpPr>
@@ -28904,7 +28904,7 @@
         </p:grpSpPr>
         <p:sp>
           <p:nvSpPr>
-            <p:cNvPr id="469" name="Google Shape;469;g3100cd6168a_0_0"/>
+            <p:cNvPr id="468" name="Google Shape;468;g3100cd6168a_0_0"/>
             <p:cNvSpPr/>
             <p:nvPr/>
           </p:nvSpPr>
@@ -28958,7 +28958,7 @@
         </p:sp>
         <p:sp>
           <p:nvSpPr>
-            <p:cNvPr id="470" name="Google Shape;470;g3100cd6168a_0_0"/>
+            <p:cNvPr id="469" name="Google Shape;469;g3100cd6168a_0_0"/>
             <p:cNvSpPr/>
             <p:nvPr/>
           </p:nvSpPr>
@@ -29012,7 +29012,7 @@
         </p:sp>
         <p:sp>
           <p:nvSpPr>
-            <p:cNvPr id="471" name="Google Shape;471;g3100cd6168a_0_0"/>
+            <p:cNvPr id="470" name="Google Shape;470;g3100cd6168a_0_0"/>
             <p:cNvSpPr/>
             <p:nvPr/>
           </p:nvSpPr>
@@ -29078,7 +29078,7 @@
   <p:cSld>
     <p:spTree>
       <p:nvGrpSpPr>
-        <p:cNvPr id="476" name="Shape 476"/>
+        <p:cNvPr id="475" name="Shape 475"/>
         <p:cNvGrpSpPr/>
         <p:nvPr/>
       </p:nvGrpSpPr>
@@ -29092,7 +29092,7 @@
       </p:grpSpPr>
       <p:sp>
         <p:nvSpPr>
-          <p:cNvPr id="477" name="Google Shape;477;g30edab3001c_2_1204"/>
+          <p:cNvPr id="476" name="Google Shape;476;g30edab3001c_2_1204"/>
           <p:cNvSpPr txBox="1"/>
           <p:nvPr>
             <p:ph type="title"/>
@@ -29132,7 +29132,7 @@
       </p:sp>
       <p:sp>
         <p:nvSpPr>
-          <p:cNvPr id="478" name="Google Shape;478;g30edab3001c_2_1204"/>
+          <p:cNvPr id="477" name="Google Shape;477;g30edab3001c_2_1204"/>
           <p:cNvSpPr txBox="1"/>
           <p:nvPr>
             <p:ph idx="1" type="body"/>
@@ -29299,7 +29299,7 @@
       </p:sp>
       <p:sp>
         <p:nvSpPr>
-          <p:cNvPr id="479" name="Google Shape;479;g30edab3001c_2_1204"/>
+          <p:cNvPr id="478" name="Google Shape;478;g30edab3001c_2_1204"/>
           <p:cNvSpPr txBox="1"/>
           <p:nvPr/>
         </p:nvSpPr>
@@ -29451,7 +29451,7 @@
   <p:cSld>
     <p:spTree>
       <p:nvGrpSpPr>
-        <p:cNvPr id="484" name="Shape 484"/>
+        <p:cNvPr id="483" name="Shape 483"/>
         <p:cNvGrpSpPr/>
         <p:nvPr/>
       </p:nvGrpSpPr>
@@ -29465,7 +29465,7 @@
       </p:grpSpPr>
       <p:sp>
         <p:nvSpPr>
-          <p:cNvPr id="485" name="Google Shape;485;g30edab3001c_2_1184"/>
+          <p:cNvPr id="484" name="Google Shape;484;g30edab3001c_2_1184"/>
           <p:cNvSpPr txBox="1"/>
           <p:nvPr>
             <p:ph type="title"/>
@@ -29505,7 +29505,7 @@
       </p:sp>
       <p:sp>
         <p:nvSpPr>
-          <p:cNvPr id="486" name="Google Shape;486;g30edab3001c_2_1184"/>
+          <p:cNvPr id="485" name="Google Shape;485;g30edab3001c_2_1184"/>
           <p:cNvSpPr txBox="1"/>
           <p:nvPr/>
         </p:nvSpPr>
@@ -29547,7 +29547,7 @@
       </p:sp>
       <p:sp>
         <p:nvSpPr>
-          <p:cNvPr id="487" name="Google Shape;487;g30edab3001c_2_1184"/>
+          <p:cNvPr id="486" name="Google Shape;486;g30edab3001c_2_1184"/>
           <p:cNvSpPr txBox="1"/>
           <p:nvPr>
             <p:ph idx="2" type="title"/>
@@ -29587,7 +29587,7 @@
       </p:sp>
       <p:grpSp>
         <p:nvGrpSpPr>
-          <p:cNvPr id="488" name="Google Shape;488;g30edab3001c_2_1184"/>
+          <p:cNvPr id="487" name="Google Shape;487;g30edab3001c_2_1184"/>
           <p:cNvGrpSpPr/>
           <p:nvPr/>
         </p:nvGrpSpPr>
@@ -29601,7 +29601,7 @@
         </p:grpSpPr>
         <p:sp>
           <p:nvSpPr>
-            <p:cNvPr id="489" name="Google Shape;489;g30edab3001c_2_1184"/>
+            <p:cNvPr id="488" name="Google Shape;488;g30edab3001c_2_1184"/>
             <p:cNvSpPr/>
             <p:nvPr/>
           </p:nvSpPr>
@@ -29655,7 +29655,7 @@
         </p:sp>
         <p:sp>
           <p:nvSpPr>
-            <p:cNvPr id="490" name="Google Shape;490;g30edab3001c_2_1184"/>
+            <p:cNvPr id="489" name="Google Shape;489;g30edab3001c_2_1184"/>
             <p:cNvSpPr/>
             <p:nvPr/>
           </p:nvSpPr>
@@ -29709,7 +29709,7 @@
         </p:sp>
         <p:sp>
           <p:nvSpPr>
-            <p:cNvPr id="491" name="Google Shape;491;g30edab3001c_2_1184"/>
+            <p:cNvPr id="490" name="Google Shape;490;g30edab3001c_2_1184"/>
             <p:cNvSpPr/>
             <p:nvPr/>
           </p:nvSpPr>
@@ -29775,7 +29775,7 @@
   <p:cSld>
     <p:spTree>
       <p:nvGrpSpPr>
-        <p:cNvPr id="496" name="Shape 496"/>
+        <p:cNvPr id="495" name="Shape 495"/>
         <p:cNvGrpSpPr/>
         <p:nvPr/>
       </p:nvGrpSpPr>
@@ -29789,7 +29789,7 @@
       </p:grpSpPr>
       <p:sp>
         <p:nvSpPr>
-          <p:cNvPr id="497" name="Google Shape;497;g30f9ff7ea99_0_42"/>
+          <p:cNvPr id="496" name="Google Shape;496;g30f9ff7ea99_0_42"/>
           <p:cNvSpPr txBox="1"/>
           <p:nvPr>
             <p:ph idx="6" type="subTitle"/>
@@ -29797,8 +29797,8 @@
         </p:nvSpPr>
         <p:spPr>
           <a:xfrm>
-            <a:off x="8116825" y="4144638"/>
-            <a:ext cx="3115200" cy="542700"/>
+            <a:off x="7913609" y="2604349"/>
+            <a:ext cx="2687100" cy="451800"/>
           </a:xfrm>
           <a:prstGeom prst="rect">
             <a:avLst/>
@@ -29829,7 +29829,7 @@
       </p:sp>
       <p:sp>
         <p:nvSpPr>
-          <p:cNvPr id="498" name="Google Shape;498;g30f9ff7ea99_0_42"/>
+          <p:cNvPr id="497" name="Google Shape;497;g30f9ff7ea99_0_42"/>
           <p:cNvSpPr txBox="1"/>
           <p:nvPr>
             <p:ph idx="1" type="subTitle"/>
@@ -29837,8 +29837,8 @@
         </p:nvSpPr>
         <p:spPr>
           <a:xfrm>
-            <a:off x="960025" y="4144638"/>
-            <a:ext cx="3115200" cy="542700"/>
+            <a:off x="1740568" y="2604349"/>
+            <a:ext cx="2687100" cy="451800"/>
           </a:xfrm>
           <a:prstGeom prst="rect">
             <a:avLst/>
@@ -29869,7 +29869,7 @@
       </p:sp>
       <p:sp>
         <p:nvSpPr>
-          <p:cNvPr id="499" name="Google Shape;499;g30f9ff7ea99_0_42"/>
+          <p:cNvPr id="498" name="Google Shape;498;g30f9ff7ea99_0_42"/>
           <p:cNvSpPr txBox="1"/>
           <p:nvPr>
             <p:ph idx="5" type="subTitle"/>
@@ -29877,8 +29877,8 @@
         </p:nvSpPr>
         <p:spPr>
           <a:xfrm>
-            <a:off x="4538425" y="4144638"/>
-            <a:ext cx="3115200" cy="542700"/>
+            <a:off x="4827089" y="2604349"/>
+            <a:ext cx="2687100" cy="451800"/>
           </a:xfrm>
           <a:prstGeom prst="rect">
             <a:avLst/>
@@ -29909,7 +29909,7 @@
       </p:sp>
       <p:sp>
         <p:nvSpPr>
-          <p:cNvPr id="500" name="Google Shape;500;g30f9ff7ea99_0_42"/>
+          <p:cNvPr id="499" name="Google Shape;499;g30f9ff7ea99_0_42"/>
           <p:cNvSpPr txBox="1"/>
           <p:nvPr>
             <p:ph idx="7" type="subTitle"/>
@@ -29917,8 +29917,8 @@
         </p:nvSpPr>
         <p:spPr>
           <a:xfrm>
-            <a:off x="960025" y="4682339"/>
-            <a:ext cx="3115200" cy="709500"/>
+            <a:off x="1740568" y="3052053"/>
+            <a:ext cx="2687100" cy="590700"/>
           </a:xfrm>
           <a:prstGeom prst="rect">
             <a:avLst/>
@@ -29949,7 +29949,7 @@
       </p:sp>
       <p:sp>
         <p:nvSpPr>
-          <p:cNvPr id="501" name="Google Shape;501;g30f9ff7ea99_0_42"/>
+          <p:cNvPr id="500" name="Google Shape;500;g30f9ff7ea99_0_42"/>
           <p:cNvSpPr txBox="1"/>
           <p:nvPr>
             <p:ph idx="8" type="subTitle"/>
@@ -29957,8 +29957,8 @@
         </p:nvSpPr>
         <p:spPr>
           <a:xfrm>
-            <a:off x="4538425" y="4682339"/>
-            <a:ext cx="3115200" cy="709500"/>
+            <a:off x="4827089" y="3052053"/>
+            <a:ext cx="2687100" cy="590700"/>
           </a:xfrm>
           <a:prstGeom prst="rect">
             <a:avLst/>
@@ -29989,7 +29989,7 @@
       </p:sp>
       <p:sp>
         <p:nvSpPr>
-          <p:cNvPr id="502" name="Google Shape;502;g30f9ff7ea99_0_42"/>
+          <p:cNvPr id="501" name="Google Shape;501;g30f9ff7ea99_0_42"/>
           <p:cNvSpPr txBox="1"/>
           <p:nvPr>
             <p:ph idx="9" type="subTitle"/>
@@ -29997,8 +29997,8 @@
         </p:nvSpPr>
         <p:spPr>
           <a:xfrm>
-            <a:off x="8116825" y="4682339"/>
-            <a:ext cx="3115200" cy="709500"/>
+            <a:off x="7913609" y="3052053"/>
+            <a:ext cx="2687100" cy="590700"/>
           </a:xfrm>
           <a:prstGeom prst="rect">
             <a:avLst/>
@@ -30029,7 +30029,7 @@
       </p:sp>
       <p:pic>
         <p:nvPicPr>
-          <p:cNvPr id="503" name="Google Shape;503;g30f9ff7ea99_0_42"/>
+          <p:cNvPr id="502" name="Google Shape;502;g30f9ff7ea99_0_42"/>
           <p:cNvPicPr preferRelativeResize="0"/>
           <p:nvPr/>
         </p:nvPicPr>
@@ -30043,8 +30043,36 @@
         </p:blipFill>
         <p:spPr>
           <a:xfrm>
-            <a:off x="622600" y="1466154"/>
-            <a:ext cx="3790049" cy="2526083"/>
+            <a:off x="1449525" y="374176"/>
+            <a:ext cx="3269079" cy="2103281"/>
+          </a:xfrm>
+          <a:prstGeom prst="rect">
+            <a:avLst/>
+          </a:prstGeom>
+          <a:noFill/>
+          <a:ln>
+            <a:noFill/>
+          </a:ln>
+        </p:spPr>
+      </p:pic>
+      <p:pic>
+        <p:nvPicPr>
+          <p:cNvPr id="503" name="Google Shape;503;g30f9ff7ea99_0_42"/>
+          <p:cNvPicPr preferRelativeResize="0"/>
+          <p:nvPr/>
+        </p:nvPicPr>
+        <p:blipFill>
+          <a:blip r:embed="rId4">
+            <a:alphaModFix/>
+          </a:blip>
+          <a:stretch>
+            <a:fillRect/>
+          </a:stretch>
+        </p:blipFill>
+        <p:spPr>
+          <a:xfrm>
+            <a:off x="8075087" y="501068"/>
+            <a:ext cx="2364036" cy="2103280"/>
           </a:xfrm>
           <a:prstGeom prst="rect">
             <a:avLst/>
@@ -30062,7 +30090,7 @@
           <p:nvPr/>
         </p:nvPicPr>
         <p:blipFill>
-          <a:blip r:embed="rId4">
+          <a:blip r:embed="rId5">
             <a:alphaModFix/>
           </a:blip>
           <a:stretch>
@@ -30071,8 +30099,8 @@
         </p:blipFill>
         <p:spPr>
           <a:xfrm>
-            <a:off x="8304037" y="1618554"/>
-            <a:ext cx="2740776" cy="2526082"/>
+            <a:off x="5081161" y="501068"/>
+            <a:ext cx="2178853" cy="2103282"/>
           </a:xfrm>
           <a:prstGeom prst="rect">
             <a:avLst/>
@@ -30083,14 +30111,94 @@
           </a:ln>
         </p:spPr>
       </p:pic>
+      <p:sp>
+        <p:nvSpPr>
+          <p:cNvPr id="505" name="Google Shape;505;g30f9ff7ea99_0_42"/>
+          <p:cNvSpPr txBox="1"/>
+          <p:nvPr>
+            <p:ph idx="6" type="subTitle"/>
+          </p:nvPr>
+        </p:nvSpPr>
+        <p:spPr>
+          <a:xfrm>
+            <a:off x="3836700" y="5248175"/>
+            <a:ext cx="3975600" cy="451800"/>
+          </a:xfrm>
+          <a:prstGeom prst="rect">
+            <a:avLst/>
+          </a:prstGeom>
+        </p:spPr>
+        <p:txBody>
+          <a:bodyPr anchorCtr="0" anchor="b" bIns="121900" lIns="121900" spcFirstLastPara="1" rIns="121900" wrap="square" tIns="121900">
+            <a:noAutofit/>
+          </a:bodyPr>
+          <a:lstStyle/>
+          <a:p>
+            <a:pPr indent="0" lvl="0" marL="0" rtl="0" algn="ctr">
+              <a:spcBef>
+                <a:spcPts val="0"/>
+              </a:spcBef>
+              <a:spcAft>
+                <a:spcPts val="0"/>
+              </a:spcAft>
+              <a:buNone/>
+            </a:pPr>
+            <a:r>
+              <a:rPr lang="en-US"/>
+              <a:t>Business Intelligence</a:t>
+            </a:r>
+            <a:endParaRPr/>
+          </a:p>
+        </p:txBody>
+      </p:sp>
+      <p:sp>
+        <p:nvSpPr>
+          <p:cNvPr id="506" name="Google Shape;506;g30f9ff7ea99_0_42"/>
+          <p:cNvSpPr txBox="1"/>
+          <p:nvPr>
+            <p:ph idx="9" type="subTitle"/>
+          </p:nvPr>
+        </p:nvSpPr>
+        <p:spPr>
+          <a:xfrm>
+            <a:off x="4572934" y="5695878"/>
+            <a:ext cx="2687100" cy="590700"/>
+          </a:xfrm>
+          <a:prstGeom prst="rect">
+            <a:avLst/>
+          </a:prstGeom>
+        </p:spPr>
+        <p:txBody>
+          <a:bodyPr anchorCtr="0" anchor="ctr" bIns="121900" lIns="121900" spcFirstLastPara="1" rIns="121900" wrap="square" tIns="121900">
+            <a:noAutofit/>
+          </a:bodyPr>
+          <a:lstStyle/>
+          <a:p>
+            <a:pPr indent="0" lvl="0" marL="0" rtl="0" algn="ctr">
+              <a:spcBef>
+                <a:spcPts val="0"/>
+              </a:spcBef>
+              <a:spcAft>
+                <a:spcPts val="0"/>
+              </a:spcAft>
+              <a:buNone/>
+            </a:pPr>
+            <a:r>
+              <a:rPr lang="en-US"/>
+              <a:t>PowerBI</a:t>
+            </a:r>
+            <a:endParaRPr/>
+          </a:p>
+        </p:txBody>
+      </p:sp>
       <p:pic>
         <p:nvPicPr>
-          <p:cNvPr id="505" name="Google Shape;505;g30f9ff7ea99_0_42"/>
+          <p:cNvPr id="507" name="Google Shape;507;g30f9ff7ea99_0_42"/>
           <p:cNvPicPr preferRelativeResize="0"/>
           <p:nvPr/>
         </p:nvPicPr>
         <p:blipFill>
-          <a:blip r:embed="rId5">
+          <a:blip r:embed="rId6">
             <a:alphaModFix/>
           </a:blip>
           <a:stretch>
@@ -30099,8 +30207,8 @@
         </p:blipFill>
         <p:spPr>
           <a:xfrm>
-            <a:off x="4832987" y="1618554"/>
-            <a:ext cx="2526084" cy="2526084"/>
+            <a:off x="4075750" y="3517916"/>
+            <a:ext cx="3269074" cy="2330487"/>
           </a:xfrm>
           <a:prstGeom prst="rect">
             <a:avLst/>
@@ -30124,7 +30232,7 @@
   <p:cSld>
     <p:spTree>
       <p:nvGrpSpPr>
-        <p:cNvPr id="510" name="Shape 510"/>
+        <p:cNvPr id="512" name="Shape 512"/>
         <p:cNvGrpSpPr/>
         <p:nvPr/>
       </p:nvGrpSpPr>
@@ -30138,7 +30246,7 @@
       </p:grpSpPr>
       <p:sp>
         <p:nvSpPr>
-          <p:cNvPr id="511" name="Google Shape;511;g3100cd6168a_6_32"/>
+          <p:cNvPr id="513" name="Google Shape;513;g3100cd6168a_6_32"/>
           <p:cNvSpPr txBox="1"/>
           <p:nvPr>
             <p:ph type="title"/>
@@ -30178,7 +30286,7 @@
       </p:sp>
       <p:sp>
         <p:nvSpPr>
-          <p:cNvPr id="512" name="Google Shape;512;g3100cd6168a_6_32"/>
+          <p:cNvPr id="514" name="Google Shape;514;g3100cd6168a_6_32"/>
           <p:cNvSpPr txBox="1"/>
           <p:nvPr/>
         </p:nvSpPr>
@@ -30220,7 +30328,7 @@
       </p:sp>
       <p:sp>
         <p:nvSpPr>
-          <p:cNvPr id="513" name="Google Shape;513;g3100cd6168a_6_32"/>
+          <p:cNvPr id="515" name="Google Shape;515;g3100cd6168a_6_32"/>
           <p:cNvSpPr txBox="1"/>
           <p:nvPr>
             <p:ph idx="2" type="title"/>
@@ -30260,7 +30368,7 @@
       </p:sp>
       <p:grpSp>
         <p:nvGrpSpPr>
-          <p:cNvPr id="514" name="Google Shape;514;g3100cd6168a_6_32"/>
+          <p:cNvPr id="516" name="Google Shape;516;g3100cd6168a_6_32"/>
           <p:cNvGrpSpPr/>
           <p:nvPr/>
         </p:nvGrpSpPr>
@@ -30274,7 +30382,7 @@
         </p:grpSpPr>
         <p:sp>
           <p:nvSpPr>
-            <p:cNvPr id="515" name="Google Shape;515;g3100cd6168a_6_32"/>
+            <p:cNvPr id="517" name="Google Shape;517;g3100cd6168a_6_32"/>
             <p:cNvSpPr/>
             <p:nvPr/>
           </p:nvSpPr>
@@ -30328,7 +30436,7 @@
         </p:sp>
         <p:sp>
           <p:nvSpPr>
-            <p:cNvPr id="516" name="Google Shape;516;g3100cd6168a_6_32"/>
+            <p:cNvPr id="518" name="Google Shape;518;g3100cd6168a_6_32"/>
             <p:cNvSpPr/>
             <p:nvPr/>
           </p:nvSpPr>
@@ -30382,7 +30490,7 @@
         </p:sp>
         <p:sp>
           <p:nvSpPr>
-            <p:cNvPr id="517" name="Google Shape;517;g3100cd6168a_6_32"/>
+            <p:cNvPr id="519" name="Google Shape;519;g3100cd6168a_6_32"/>
             <p:cNvSpPr/>
             <p:nvPr/>
           </p:nvSpPr>
@@ -30448,7 +30556,7 @@
   <p:cSld>
     <p:spTree>
       <p:nvGrpSpPr>
-        <p:cNvPr id="522" name="Shape 522"/>
+        <p:cNvPr id="524" name="Shape 524"/>
         <p:cNvGrpSpPr/>
         <p:nvPr/>
       </p:nvGrpSpPr>
@@ -30462,7 +30570,7 @@
       </p:grpSpPr>
       <p:sp>
         <p:nvSpPr>
-          <p:cNvPr id="523" name="Google Shape;523;g3100cd6168a_6_43"/>
+          <p:cNvPr id="525" name="Google Shape;525;g3100cd6168a_6_43"/>
           <p:cNvSpPr txBox="1"/>
           <p:nvPr>
             <p:ph type="title"/>
@@ -30502,7 +30610,7 @@
       </p:sp>
       <p:sp>
         <p:nvSpPr>
-          <p:cNvPr id="524" name="Google Shape;524;g3100cd6168a_6_43"/>
+          <p:cNvPr id="526" name="Google Shape;526;g3100cd6168a_6_43"/>
           <p:cNvSpPr txBox="1"/>
           <p:nvPr/>
         </p:nvSpPr>
@@ -30552,7 +30660,7 @@
                 <a:cs typeface="Questrial"/>
                 <a:sym typeface="Questrial"/>
               </a:rPr>
-              <a:t>Emmanuelle Padilla  (Fullstack Development)</a:t>
+              <a:t>Emmanuelle Padilla  (Front End Development)</a:t>
             </a:r>
             <a:endParaRPr sz="1900">
               <a:solidFill>
@@ -30618,7 +30726,7 @@
                 <a:cs typeface="Questrial"/>
                 <a:sym typeface="Questrial"/>
               </a:rPr>
-              <a:t>Wen Jie Long (Fullstack Development)</a:t>
+              <a:t>Wen Jie Long (Front End Development)</a:t>
             </a:r>
             <a:endParaRPr sz="1900">
               <a:solidFill>
@@ -30684,7 +30792,7 @@
                 <a:cs typeface="Questrial"/>
                 <a:sym typeface="Questrial"/>
               </a:rPr>
-              <a:t>Jeffrey Umanzor (Fullstack Development)</a:t>
+              <a:t>Jeffrey Umanzor (Back end Development)</a:t>
             </a:r>
             <a:endParaRPr sz="1900">
               <a:solidFill>
@@ -30750,7 +30858,7 @@
                 <a:cs typeface="Questrial"/>
                 <a:sym typeface="Questrial"/>
               </a:rPr>
-              <a:t>Kenny Zhu (Fullstack Development)</a:t>
+              <a:t>Kenny Zhu (Back end Development)</a:t>
             </a:r>
             <a:endParaRPr sz="1900">
               <a:solidFill>
@@ -30816,7 +30924,7 @@
                 <a:cs typeface="Questrial"/>
                 <a:sym typeface="Questrial"/>
               </a:rPr>
-              <a:t>Zi Xuan Li (Fullstack Development)</a:t>
+              <a:t>Zi Xuan Li (Front End Development)</a:t>
             </a:r>
             <a:endParaRPr sz="1900">
               <a:solidFill>
@@ -30843,7 +30951,7 @@
   <p:cSld>
     <p:spTree>
       <p:nvGrpSpPr>
-        <p:cNvPr id="529" name="Shape 529"/>
+        <p:cNvPr id="531" name="Shape 531"/>
         <p:cNvGrpSpPr/>
         <p:nvPr/>
       </p:nvGrpSpPr>
@@ -30857,7 +30965,7 @@
       </p:grpSpPr>
       <p:sp>
         <p:nvSpPr>
-          <p:cNvPr id="530" name="Google Shape;530;g30edab3001c_2_1230"/>
+          <p:cNvPr id="532" name="Google Shape;532;g30edab3001c_2_1230"/>
           <p:cNvSpPr txBox="1"/>
           <p:nvPr>
             <p:ph type="title"/>
@@ -32599,7 +32707,7 @@
         </p:nvSpPr>
         <p:spPr>
           <a:xfrm>
-            <a:off x="1958175" y="2056888"/>
+            <a:off x="1958175" y="2263625"/>
             <a:ext cx="7566000" cy="1884000"/>
           </a:xfrm>
           <a:prstGeom prst="rect">
@@ -32634,7 +32742,7 @@
                   <a:srgbClr val="434343"/>
                 </a:solidFill>
               </a:rPr>
-              <a:t>The student can search for course based on major, enroll in course, and receive any </a:t>
+              <a:t>The student can search for course based on major, view their schedule, enroll in a course, and receive any </a:t>
             </a:r>
             <a:r>
               <a:rPr lang="en-US">
@@ -32681,7 +32789,7 @@
             </a:endParaRPr>
           </a:p>
           <a:p>
-            <a:pPr indent="-349250" lvl="0" marL="457200" rtl="0" algn="l">
+            <a:pPr indent="0" lvl="0" marL="457200" rtl="0" algn="l">
               <a:lnSpc>
                 <a:spcPct val="115000"/>
               </a:lnSpc>
@@ -32691,19 +32799,10 @@
               <a:spcAft>
                 <a:spcPts val="0"/>
               </a:spcAft>
-              <a:buClr>
-                <a:srgbClr val="434343"/>
-              </a:buClr>
-              <a:buSzPts val="1900"/>
-              <a:buChar char="-"/>
+              <a:buNone/>
             </a:pPr>
             <a:r>
-              <a:rPr lang="en-US">
-                <a:solidFill>
-                  <a:srgbClr val="434343"/>
-                </a:solidFill>
-              </a:rPr>
-              <a:t>The student searches for tutors by subject, views availability, selects a time, and books a session. </a:t>
+              <a:t/>
             </a:r>
             <a:endParaRPr/>
           </a:p>
@@ -32759,7 +32858,7 @@
         </p:nvSpPr>
         <p:spPr>
           <a:xfrm>
-            <a:off x="1884700" y="3940904"/>
+            <a:off x="1873200" y="3371779"/>
             <a:ext cx="3135900" cy="475500"/>
           </a:xfrm>
           <a:prstGeom prst="rect">
@@ -32799,7 +32898,7 @@
         </p:nvSpPr>
         <p:spPr>
           <a:xfrm>
-            <a:off x="1971375" y="4444400"/>
+            <a:off x="1971375" y="3950025"/>
             <a:ext cx="7539600" cy="1547700"/>
           </a:xfrm>
           <a:prstGeom prst="rect">
@@ -32878,7 +32977,7 @@
         </p:blipFill>
         <p:spPr>
           <a:xfrm>
-            <a:off x="9082775" y="572575"/>
+            <a:off x="9135775" y="360550"/>
             <a:ext cx="2376225" cy="2376225"/>
           </a:xfrm>
           <a:prstGeom prst="rect">
@@ -32959,34 +33058,6 @@
           </a:p>
         </p:txBody>
       </p:sp>
-      <p:pic>
-        <p:nvPicPr>
-          <p:cNvPr id="433" name="Google Shape;433;g30f9ff7ea99_0_67"/>
-          <p:cNvPicPr preferRelativeResize="0"/>
-          <p:nvPr/>
-        </p:nvPicPr>
-        <p:blipFill>
-          <a:blip r:embed="rId3">
-            <a:alphaModFix/>
-          </a:blip>
-          <a:stretch>
-            <a:fillRect/>
-          </a:stretch>
-        </p:blipFill>
-        <p:spPr>
-          <a:xfrm>
-            <a:off x="373100" y="1540250"/>
-            <a:ext cx="11494052" cy="3344950"/>
-          </a:xfrm>
-          <a:prstGeom prst="rect">
-            <a:avLst/>
-          </a:prstGeom>
-          <a:noFill/>
-          <a:ln>
-            <a:noFill/>
-          </a:ln>
-        </p:spPr>
-      </p:pic>
     </p:spTree>
   </p:cSld>
   <p:clrMapOvr>
@@ -33000,7 +33071,7 @@
   <p:cSld>
     <p:spTree>
       <p:nvGrpSpPr>
-        <p:cNvPr id="438" name="Shape 438"/>
+        <p:cNvPr id="437" name="Shape 437"/>
         <p:cNvGrpSpPr/>
         <p:nvPr/>
       </p:nvGrpSpPr>
@@ -33014,7 +33085,7 @@
       </p:grpSpPr>
       <p:sp>
         <p:nvSpPr>
-          <p:cNvPr id="439" name="Google Shape;439;g3100cd6168a_2_1"/>
+          <p:cNvPr id="438" name="Google Shape;438;g3100cd6168a_2_1"/>
           <p:cNvSpPr txBox="1"/>
           <p:nvPr>
             <p:ph type="title"/>
@@ -33054,7 +33125,7 @@
       </p:sp>
       <p:pic>
         <p:nvPicPr>
-          <p:cNvPr id="440" name="Google Shape;440;g3100cd6168a_2_1"/>
+          <p:cNvPr id="439" name="Google Shape;439;g3100cd6168a_2_1"/>
           <p:cNvPicPr preferRelativeResize="0"/>
           <p:nvPr/>
         </p:nvPicPr>
@@ -33089,6 +33160,285 @@
 </file>
 
 <file path=ppt/theme/theme1.xml><?xml version="1.0" encoding="utf-8"?>
+<a:theme xmlns:a="http://schemas.openxmlformats.org/drawingml/2006/main" xmlns:r="http://schemas.openxmlformats.org/officeDocument/2006/relationships" name="Simple Conference Style Presentation By Slidesgo">
+  <a:themeElements>
+    <a:clrScheme name="Simple Light">
+      <a:dk1>
+        <a:srgbClr val="5C5948"/>
+      </a:dk1>
+      <a:lt1>
+        <a:srgbClr val="FFFFFF"/>
+      </a:lt1>
+      <a:dk2>
+        <a:srgbClr val="C0B39D"/>
+      </a:dk2>
+      <a:lt2>
+        <a:srgbClr val="C1BFA8"/>
+      </a:lt2>
+      <a:accent1>
+        <a:srgbClr val="CEC2C0"/>
+      </a:accent1>
+      <a:accent2>
+        <a:srgbClr val="E0CC97"/>
+      </a:accent2>
+      <a:accent3>
+        <a:srgbClr val="FFFFFF"/>
+      </a:accent3>
+      <a:accent4>
+        <a:srgbClr val="FFFFFF"/>
+      </a:accent4>
+      <a:accent5>
+        <a:srgbClr val="FFFFFF"/>
+      </a:accent5>
+      <a:accent6>
+        <a:srgbClr val="FFFFFF"/>
+      </a:accent6>
+      <a:hlink>
+        <a:srgbClr val="5C5948"/>
+      </a:hlink>
+      <a:folHlink>
+        <a:srgbClr val="0097A7"/>
+      </a:folHlink>
+    </a:clrScheme>
+    <a:fontScheme name="Office">
+      <a:majorFont>
+        <a:latin typeface="Arial"/>
+        <a:ea typeface=""/>
+        <a:cs typeface=""/>
+        <a:font script="Jpan" typeface="ＭＳ Ｐゴシック"/>
+        <a:font script="Hang" typeface="맑은 고딕"/>
+        <a:font script="Hans" typeface="宋体"/>
+        <a:font script="Hant" typeface="新細明體"/>
+        <a:font script="Arab" typeface="Times New Roman"/>
+        <a:font script="Hebr" typeface="Times New Roman"/>
+        <a:font script="Thai" typeface="Angsana New"/>
+        <a:font script="Ethi" typeface="Nyala"/>
+        <a:font script="Beng" typeface="Vrinda"/>
+        <a:font script="Gujr" typeface="Shruti"/>
+        <a:font script="Khmr" typeface="MoolBoran"/>
+        <a:font script="Knda" typeface="Tunga"/>
+        <a:font script="Guru" typeface="Raavi"/>
+        <a:font script="Cans" typeface="Euphemia"/>
+        <a:font script="Cher" typeface="Plantagenet Cherokee"/>
+        <a:font script="Yiii" typeface="Microsoft Yi Baiti"/>
+        <a:font script="Tibt" typeface="Microsoft Himalaya"/>
+        <a:font script="Thaa" typeface="MV Boli"/>
+        <a:font script="Deva" typeface="Mangal"/>
+        <a:font script="Telu" typeface="Gautami"/>
+        <a:font script="Taml" typeface="Latha"/>
+        <a:font script="Syrc" typeface="Estrangelo Edessa"/>
+        <a:font script="Orya" typeface="Kalinga"/>
+        <a:font script="Mlym" typeface="Kartika"/>
+        <a:font script="Laoo" typeface="DokChampa"/>
+        <a:font script="Sinh" typeface="Iskoola Pota"/>
+        <a:font script="Mong" typeface="Mongolian Baiti"/>
+        <a:font script="Viet" typeface="Times New Roman"/>
+        <a:font script="Uigh" typeface="Microsoft Uighur"/>
+        <a:font script="Geor" typeface="Sylfaen"/>
+      </a:majorFont>
+      <a:minorFont>
+        <a:latin typeface="Arial"/>
+        <a:ea typeface=""/>
+        <a:cs typeface=""/>
+        <a:font script="Jpan" typeface="ＭＳ Ｐゴシック"/>
+        <a:font script="Hang" typeface="맑은 고딕"/>
+        <a:font script="Hans" typeface="宋体"/>
+        <a:font script="Hant" typeface="新細明體"/>
+        <a:font script="Arab" typeface="Arial"/>
+        <a:font script="Hebr" typeface="Arial"/>
+        <a:font script="Thai" typeface="Cordia New"/>
+        <a:font script="Ethi" typeface="Nyala"/>
+        <a:font script="Beng" typeface="Vrinda"/>
+        <a:font script="Gujr" typeface="Shruti"/>
+        <a:font script="Khmr" typeface="DaunPenh"/>
+        <a:font script="Knda" typeface="Tunga"/>
+        <a:font script="Guru" typeface="Raavi"/>
+        <a:font script="Cans" typeface="Euphemia"/>
+        <a:font script="Cher" typeface="Plantagenet Cherokee"/>
+        <a:font script="Yiii" typeface="Microsoft Yi Baiti"/>
+        <a:font script="Tibt" typeface="Microsoft Himalaya"/>
+        <a:font script="Thaa" typeface="MV Boli"/>
+        <a:font script="Deva" typeface="Mangal"/>
+        <a:font script="Telu" typeface="Gautami"/>
+        <a:font script="Taml" typeface="Latha"/>
+        <a:font script="Syrc" typeface="Estrangelo Edessa"/>
+        <a:font script="Orya" typeface="Kalinga"/>
+        <a:font script="Mlym" typeface="Kartika"/>
+        <a:font script="Laoo" typeface="DokChampa"/>
+        <a:font script="Sinh" typeface="Iskoola Pota"/>
+        <a:font script="Mong" typeface="Mongolian Baiti"/>
+        <a:font script="Viet" typeface="Arial"/>
+        <a:font script="Uigh" typeface="Microsoft Uighur"/>
+        <a:font script="Geor" typeface="Sylfaen"/>
+      </a:minorFont>
+    </a:fontScheme>
+    <a:fmtScheme name="Office">
+      <a:fillStyleLst>
+        <a:solidFill>
+          <a:schemeClr val="phClr"/>
+        </a:solidFill>
+        <a:gradFill rotWithShape="1">
+          <a:gsLst>
+            <a:gs pos="0">
+              <a:schemeClr val="phClr">
+                <a:tint val="50000"/>
+                <a:satMod val="300000"/>
+              </a:schemeClr>
+            </a:gs>
+            <a:gs pos="35000">
+              <a:schemeClr val="phClr">
+                <a:tint val="37000"/>
+                <a:satMod val="300000"/>
+              </a:schemeClr>
+            </a:gs>
+            <a:gs pos="100000">
+              <a:schemeClr val="phClr">
+                <a:tint val="15000"/>
+                <a:satMod val="350000"/>
+              </a:schemeClr>
+            </a:gs>
+          </a:gsLst>
+          <a:lin ang="16200000" scaled="1"/>
+        </a:gradFill>
+        <a:gradFill rotWithShape="1">
+          <a:gsLst>
+            <a:gs pos="0">
+              <a:schemeClr val="phClr">
+                <a:tint val="100000"/>
+                <a:shade val="100000"/>
+                <a:satMod val="130000"/>
+              </a:schemeClr>
+            </a:gs>
+            <a:gs pos="100000">
+              <a:schemeClr val="phClr">
+                <a:tint val="50000"/>
+                <a:shade val="100000"/>
+                <a:satMod val="350000"/>
+              </a:schemeClr>
+            </a:gs>
+          </a:gsLst>
+          <a:lin ang="16200000" scaled="0"/>
+        </a:gradFill>
+      </a:fillStyleLst>
+      <a:lnStyleLst>
+        <a:ln w="9525" cap="flat" cmpd="sng" algn="ctr">
+          <a:solidFill>
+            <a:schemeClr val="phClr">
+              <a:shade val="95000"/>
+              <a:satMod val="105000"/>
+            </a:schemeClr>
+          </a:solidFill>
+          <a:prstDash val="solid"/>
+        </a:ln>
+        <a:ln w="25400" cap="flat" cmpd="sng" algn="ctr">
+          <a:solidFill>
+            <a:schemeClr val="phClr"/>
+          </a:solidFill>
+          <a:prstDash val="solid"/>
+        </a:ln>
+        <a:ln w="38100" cap="flat" cmpd="sng" algn="ctr">
+          <a:solidFill>
+            <a:schemeClr val="phClr"/>
+          </a:solidFill>
+          <a:prstDash val="solid"/>
+        </a:ln>
+      </a:lnStyleLst>
+      <a:effectStyleLst>
+        <a:effectStyle>
+          <a:effectLst>
+            <a:outerShdw blurRad="40000" dist="20000" dir="5400000" rotWithShape="0">
+              <a:srgbClr val="000000">
+                <a:alpha val="38000"/>
+              </a:srgbClr>
+            </a:outerShdw>
+          </a:effectLst>
+        </a:effectStyle>
+        <a:effectStyle>
+          <a:effectLst>
+            <a:outerShdw blurRad="40000" dist="23000" dir="5400000" rotWithShape="0">
+              <a:srgbClr val="000000">
+                <a:alpha val="35000"/>
+              </a:srgbClr>
+            </a:outerShdw>
+          </a:effectLst>
+        </a:effectStyle>
+        <a:effectStyle>
+          <a:effectLst>
+            <a:outerShdw blurRad="40000" dist="23000" dir="5400000" rotWithShape="0">
+              <a:srgbClr val="000000">
+                <a:alpha val="35000"/>
+              </a:srgbClr>
+            </a:outerShdw>
+          </a:effectLst>
+          <a:scene3d>
+            <a:camera prst="orthographicFront">
+              <a:rot lat="0" lon="0" rev="0"/>
+            </a:camera>
+            <a:lightRig rig="threePt" dir="t">
+              <a:rot lat="0" lon="0" rev="1200000"/>
+            </a:lightRig>
+          </a:scene3d>
+          <a:sp3d>
+            <a:bevelT w="63500" h="25400"/>
+          </a:sp3d>
+        </a:effectStyle>
+      </a:effectStyleLst>
+      <a:bgFillStyleLst>
+        <a:solidFill>
+          <a:schemeClr val="phClr"/>
+        </a:solidFill>
+        <a:gradFill rotWithShape="1">
+          <a:gsLst>
+            <a:gs pos="0">
+              <a:schemeClr val="phClr">
+                <a:tint val="40000"/>
+                <a:satMod val="350000"/>
+              </a:schemeClr>
+            </a:gs>
+            <a:gs pos="40000">
+              <a:schemeClr val="phClr">
+                <a:tint val="45000"/>
+                <a:shade val="99000"/>
+                <a:satMod val="350000"/>
+              </a:schemeClr>
+            </a:gs>
+            <a:gs pos="100000">
+              <a:schemeClr val="phClr">
+                <a:shade val="20000"/>
+                <a:satMod val="255000"/>
+              </a:schemeClr>
+            </a:gs>
+          </a:gsLst>
+          <a:path path="circle">
+            <a:fillToRect l="50000" t="-80000" r="50000" b="180000"/>
+          </a:path>
+        </a:gradFill>
+        <a:gradFill rotWithShape="1">
+          <a:gsLst>
+            <a:gs pos="0">
+              <a:schemeClr val="phClr">
+                <a:tint val="80000"/>
+                <a:satMod val="300000"/>
+              </a:schemeClr>
+            </a:gs>
+            <a:gs pos="100000">
+              <a:schemeClr val="phClr">
+                <a:shade val="30000"/>
+                <a:satMod val="200000"/>
+              </a:schemeClr>
+            </a:gs>
+          </a:gsLst>
+          <a:path path="circle">
+            <a:fillToRect l="50000" t="50000" r="50000" b="50000"/>
+          </a:path>
+        </a:gradFill>
+      </a:bgFillStyleLst>
+    </a:fmtScheme>
+  </a:themeElements>
+</a:theme>
+</file>
+
+<file path=ppt/theme/theme2.xml><?xml version="1.0" encoding="utf-8"?>
 <a:theme xmlns:a="http://schemas.openxmlformats.org/drawingml/2006/main" xmlns:r="http://schemas.openxmlformats.org/officeDocument/2006/relationships" name="Office Theme">
   <a:themeElements>
     <a:clrScheme name="Office">
@@ -33365,283 +33715,4 @@
     </a:fmtScheme>
   </a:themeElements>
 </a:theme>
-</file>
-
-<file path=ppt/theme/theme2.xml><?xml version="1.0" encoding="utf-8"?>
-<a:theme xmlns:a="http://schemas.openxmlformats.org/drawingml/2006/main" xmlns:r="http://schemas.openxmlformats.org/officeDocument/2006/relationships" name="Simple Conference Style Presentation By Slidesgo">
-  <a:themeElements>
-    <a:clrScheme name="Simple Light">
-      <a:dk1>
-        <a:srgbClr val="5C5948"/>
-      </a:dk1>
-      <a:lt1>
-        <a:srgbClr val="FFFFFF"/>
-      </a:lt1>
-      <a:dk2>
-        <a:srgbClr val="C0B39D"/>
-      </a:dk2>
-      <a:lt2>
-        <a:srgbClr val="C1BFA8"/>
-      </a:lt2>
-      <a:accent1>
-        <a:srgbClr val="CEC2C0"/>
-      </a:accent1>
-      <a:accent2>
-        <a:srgbClr val="E0CC97"/>
-      </a:accent2>
-      <a:accent3>
-        <a:srgbClr val="FFFFFF"/>
-      </a:accent3>
-      <a:accent4>
-        <a:srgbClr val="FFFFFF"/>
-      </a:accent4>
-      <a:accent5>
-        <a:srgbClr val="FFFFFF"/>
-      </a:accent5>
-      <a:accent6>
-        <a:srgbClr val="FFFFFF"/>
-      </a:accent6>
-      <a:hlink>
-        <a:srgbClr val="5C5948"/>
-      </a:hlink>
-      <a:folHlink>
-        <a:srgbClr val="0097A7"/>
-      </a:folHlink>
-    </a:clrScheme>
-    <a:fontScheme name="Office">
-      <a:majorFont>
-        <a:latin typeface="Arial"/>
-        <a:ea typeface=""/>
-        <a:cs typeface=""/>
-        <a:font script="Jpan" typeface="ＭＳ Ｐゴシック"/>
-        <a:font script="Hang" typeface="맑은 고딕"/>
-        <a:font script="Hans" typeface="宋体"/>
-        <a:font script="Hant" typeface="新細明體"/>
-        <a:font script="Arab" typeface="Times New Roman"/>
-        <a:font script="Hebr" typeface="Times New Roman"/>
-        <a:font script="Thai" typeface="Angsana New"/>
-        <a:font script="Ethi" typeface="Nyala"/>
-        <a:font script="Beng" typeface="Vrinda"/>
-        <a:font script="Gujr" typeface="Shruti"/>
-        <a:font script="Khmr" typeface="MoolBoran"/>
-        <a:font script="Knda" typeface="Tunga"/>
-        <a:font script="Guru" typeface="Raavi"/>
-        <a:font script="Cans" typeface="Euphemia"/>
-        <a:font script="Cher" typeface="Plantagenet Cherokee"/>
-        <a:font script="Yiii" typeface="Microsoft Yi Baiti"/>
-        <a:font script="Tibt" typeface="Microsoft Himalaya"/>
-        <a:font script="Thaa" typeface="MV Boli"/>
-        <a:font script="Deva" typeface="Mangal"/>
-        <a:font script="Telu" typeface="Gautami"/>
-        <a:font script="Taml" typeface="Latha"/>
-        <a:font script="Syrc" typeface="Estrangelo Edessa"/>
-        <a:font script="Orya" typeface="Kalinga"/>
-        <a:font script="Mlym" typeface="Kartika"/>
-        <a:font script="Laoo" typeface="DokChampa"/>
-        <a:font script="Sinh" typeface="Iskoola Pota"/>
-        <a:font script="Mong" typeface="Mongolian Baiti"/>
-        <a:font script="Viet" typeface="Times New Roman"/>
-        <a:font script="Uigh" typeface="Microsoft Uighur"/>
-        <a:font script="Geor" typeface="Sylfaen"/>
-      </a:majorFont>
-      <a:minorFont>
-        <a:latin typeface="Arial"/>
-        <a:ea typeface=""/>
-        <a:cs typeface=""/>
-        <a:font script="Jpan" typeface="ＭＳ Ｐゴシック"/>
-        <a:font script="Hang" typeface="맑은 고딕"/>
-        <a:font script="Hans" typeface="宋体"/>
-        <a:font script="Hant" typeface="新細明體"/>
-        <a:font script="Arab" typeface="Arial"/>
-        <a:font script="Hebr" typeface="Arial"/>
-        <a:font script="Thai" typeface="Cordia New"/>
-        <a:font script="Ethi" typeface="Nyala"/>
-        <a:font script="Beng" typeface="Vrinda"/>
-        <a:font script="Gujr" typeface="Shruti"/>
-        <a:font script="Khmr" typeface="DaunPenh"/>
-        <a:font script="Knda" typeface="Tunga"/>
-        <a:font script="Guru" typeface="Raavi"/>
-        <a:font script="Cans" typeface="Euphemia"/>
-        <a:font script="Cher" typeface="Plantagenet Cherokee"/>
-        <a:font script="Yiii" typeface="Microsoft Yi Baiti"/>
-        <a:font script="Tibt" typeface="Microsoft Himalaya"/>
-        <a:font script="Thaa" typeface="MV Boli"/>
-        <a:font script="Deva" typeface="Mangal"/>
-        <a:font script="Telu" typeface="Gautami"/>
-        <a:font script="Taml" typeface="Latha"/>
-        <a:font script="Syrc" typeface="Estrangelo Edessa"/>
-        <a:font script="Orya" typeface="Kalinga"/>
-        <a:font script="Mlym" typeface="Kartika"/>
-        <a:font script="Laoo" typeface="DokChampa"/>
-        <a:font script="Sinh" typeface="Iskoola Pota"/>
-        <a:font script="Mong" typeface="Mongolian Baiti"/>
-        <a:font script="Viet" typeface="Arial"/>
-        <a:font script="Uigh" typeface="Microsoft Uighur"/>
-        <a:font script="Geor" typeface="Sylfaen"/>
-      </a:minorFont>
-    </a:fontScheme>
-    <a:fmtScheme name="Office">
-      <a:fillStyleLst>
-        <a:solidFill>
-          <a:schemeClr val="phClr"/>
-        </a:solidFill>
-        <a:gradFill rotWithShape="1">
-          <a:gsLst>
-            <a:gs pos="0">
-              <a:schemeClr val="phClr">
-                <a:tint val="50000"/>
-                <a:satMod val="300000"/>
-              </a:schemeClr>
-            </a:gs>
-            <a:gs pos="35000">
-              <a:schemeClr val="phClr">
-                <a:tint val="37000"/>
-                <a:satMod val="300000"/>
-              </a:schemeClr>
-            </a:gs>
-            <a:gs pos="100000">
-              <a:schemeClr val="phClr">
-                <a:tint val="15000"/>
-                <a:satMod val="350000"/>
-              </a:schemeClr>
-            </a:gs>
-          </a:gsLst>
-          <a:lin ang="16200000" scaled="1"/>
-        </a:gradFill>
-        <a:gradFill rotWithShape="1">
-          <a:gsLst>
-            <a:gs pos="0">
-              <a:schemeClr val="phClr">
-                <a:tint val="100000"/>
-                <a:shade val="100000"/>
-                <a:satMod val="130000"/>
-              </a:schemeClr>
-            </a:gs>
-            <a:gs pos="100000">
-              <a:schemeClr val="phClr">
-                <a:tint val="50000"/>
-                <a:shade val="100000"/>
-                <a:satMod val="350000"/>
-              </a:schemeClr>
-            </a:gs>
-          </a:gsLst>
-          <a:lin ang="16200000" scaled="0"/>
-        </a:gradFill>
-      </a:fillStyleLst>
-      <a:lnStyleLst>
-        <a:ln w="9525" cap="flat" cmpd="sng" algn="ctr">
-          <a:solidFill>
-            <a:schemeClr val="phClr">
-              <a:shade val="95000"/>
-              <a:satMod val="105000"/>
-            </a:schemeClr>
-          </a:solidFill>
-          <a:prstDash val="solid"/>
-        </a:ln>
-        <a:ln w="25400" cap="flat" cmpd="sng" algn="ctr">
-          <a:solidFill>
-            <a:schemeClr val="phClr"/>
-          </a:solidFill>
-          <a:prstDash val="solid"/>
-        </a:ln>
-        <a:ln w="38100" cap="flat" cmpd="sng" algn="ctr">
-          <a:solidFill>
-            <a:schemeClr val="phClr"/>
-          </a:solidFill>
-          <a:prstDash val="solid"/>
-        </a:ln>
-      </a:lnStyleLst>
-      <a:effectStyleLst>
-        <a:effectStyle>
-          <a:effectLst>
-            <a:outerShdw blurRad="40000" dist="20000" dir="5400000" rotWithShape="0">
-              <a:srgbClr val="000000">
-                <a:alpha val="38000"/>
-              </a:srgbClr>
-            </a:outerShdw>
-          </a:effectLst>
-        </a:effectStyle>
-        <a:effectStyle>
-          <a:effectLst>
-            <a:outerShdw blurRad="40000" dist="23000" dir="5400000" rotWithShape="0">
-              <a:srgbClr val="000000">
-                <a:alpha val="35000"/>
-              </a:srgbClr>
-            </a:outerShdw>
-          </a:effectLst>
-        </a:effectStyle>
-        <a:effectStyle>
-          <a:effectLst>
-            <a:outerShdw blurRad="40000" dist="23000" dir="5400000" rotWithShape="0">
-              <a:srgbClr val="000000">
-                <a:alpha val="35000"/>
-              </a:srgbClr>
-            </a:outerShdw>
-          </a:effectLst>
-          <a:scene3d>
-            <a:camera prst="orthographicFront">
-              <a:rot lat="0" lon="0" rev="0"/>
-            </a:camera>
-            <a:lightRig rig="threePt" dir="t">
-              <a:rot lat="0" lon="0" rev="1200000"/>
-            </a:lightRig>
-          </a:scene3d>
-          <a:sp3d>
-            <a:bevelT w="63500" h="25400"/>
-          </a:sp3d>
-        </a:effectStyle>
-      </a:effectStyleLst>
-      <a:bgFillStyleLst>
-        <a:solidFill>
-          <a:schemeClr val="phClr"/>
-        </a:solidFill>
-        <a:gradFill rotWithShape="1">
-          <a:gsLst>
-            <a:gs pos="0">
-              <a:schemeClr val="phClr">
-                <a:tint val="40000"/>
-                <a:satMod val="350000"/>
-              </a:schemeClr>
-            </a:gs>
-            <a:gs pos="40000">
-              <a:schemeClr val="phClr">
-                <a:tint val="45000"/>
-                <a:shade val="99000"/>
-                <a:satMod val="350000"/>
-              </a:schemeClr>
-            </a:gs>
-            <a:gs pos="100000">
-              <a:schemeClr val="phClr">
-                <a:shade val="20000"/>
-                <a:satMod val="255000"/>
-              </a:schemeClr>
-            </a:gs>
-          </a:gsLst>
-          <a:path path="circle">
-            <a:fillToRect l="50000" t="-80000" r="50000" b="180000"/>
-          </a:path>
-        </a:gradFill>
-        <a:gradFill rotWithShape="1">
-          <a:gsLst>
-            <a:gs pos="0">
-              <a:schemeClr val="phClr">
-                <a:tint val="80000"/>
-                <a:satMod val="300000"/>
-              </a:schemeClr>
-            </a:gs>
-            <a:gs pos="100000">
-              <a:schemeClr val="phClr">
-                <a:shade val="30000"/>
-                <a:satMod val="200000"/>
-              </a:schemeClr>
-            </a:gs>
-          </a:gsLst>
-          <a:path path="circle">
-            <a:fillToRect l="50000" t="50000" r="50000" b="50000"/>
-          </a:path>
-        </a:gradFill>
-      </a:bgFillStyleLst>
-    </a:fmtScheme>
-  </a:themeElements>
-</a:theme>
 </file>
</xml_diff>